<commit_message>
update plots, analytical solution for T
</commit_message>
<xml_diff>
--- a/figures/meniscus.pptx
+++ b/figures/meniscus.pptx
@@ -4,6 +4,9 @@
   <p:sldMasterIdLst>
     <p:sldMasterId id="2147483648" r:id="rId1"/>
   </p:sldMasterIdLst>
+  <p:notesMasterIdLst>
+    <p:notesMasterId r:id="rId4"/>
+  </p:notesMasterIdLst>
   <p:sldIdLst>
     <p:sldId id="256" r:id="rId2"/>
     <p:sldId id="258" r:id="rId3"/>
@@ -105,7 +108,446 @@
       </a:defRPr>
     </a:lvl9pPr>
   </p:defaultTextStyle>
+  <p:extLst>
+    <p:ext uri="{EFAFB233-063F-42B5-8137-9DF3F51BA10A}">
+      <p15:sldGuideLst xmlns:p15="http://schemas.microsoft.com/office/powerpoint/2012/main"/>
+    </p:ext>
+  </p:extLst>
 </p:presentation>
+</file>
+
+<file path=ppt/notesMasters/notesMaster1.xml><?xml version="1.0" encoding="utf-8"?>
+<p:notesMaster xmlns:a="http://schemas.openxmlformats.org/drawingml/2006/main" xmlns:r="http://schemas.openxmlformats.org/officeDocument/2006/relationships" xmlns:p="http://schemas.openxmlformats.org/presentationml/2006/main">
+  <p:cSld>
+    <p:bg>
+      <p:bgRef idx="1001">
+        <a:schemeClr val="bg1"/>
+      </p:bgRef>
+    </p:bg>
+    <p:spTree>
+      <p:nvGrpSpPr>
+        <p:cNvPr id="1" name=""/>
+        <p:cNvGrpSpPr/>
+        <p:nvPr/>
+      </p:nvGrpSpPr>
+      <p:grpSpPr>
+        <a:xfrm>
+          <a:off x="0" y="0"/>
+          <a:ext cx="0" cy="0"/>
+          <a:chOff x="0" y="0"/>
+          <a:chExt cx="0" cy="0"/>
+        </a:xfrm>
+      </p:grpSpPr>
+      <p:sp>
+        <p:nvSpPr>
+          <p:cNvPr id="2" name="Kopfzeilenplatzhalter 1"/>
+          <p:cNvSpPr>
+            <a:spLocks noGrp="1"/>
+          </p:cNvSpPr>
+          <p:nvPr>
+            <p:ph type="hdr" sz="quarter"/>
+          </p:nvPr>
+        </p:nvSpPr>
+        <p:spPr>
+          <a:xfrm>
+            <a:off x="0" y="0"/>
+            <a:ext cx="2971800" cy="458788"/>
+          </a:xfrm>
+          <a:prstGeom prst="rect">
+            <a:avLst/>
+          </a:prstGeom>
+        </p:spPr>
+        <p:txBody>
+          <a:bodyPr vert="horz" lIns="91440" tIns="45720" rIns="91440" bIns="45720" rtlCol="0"/>
+          <a:lstStyle>
+            <a:lvl1pPr algn="l">
+              <a:defRPr sz="1200"/>
+            </a:lvl1pPr>
+          </a:lstStyle>
+          <a:p>
+            <a:endParaRPr lang="en-US"/>
+          </a:p>
+        </p:txBody>
+      </p:sp>
+      <p:sp>
+        <p:nvSpPr>
+          <p:cNvPr id="3" name="Datumsplatzhalter 2"/>
+          <p:cNvSpPr>
+            <a:spLocks noGrp="1"/>
+          </p:cNvSpPr>
+          <p:nvPr>
+            <p:ph type="dt" idx="1"/>
+          </p:nvPr>
+        </p:nvSpPr>
+        <p:spPr>
+          <a:xfrm>
+            <a:off x="3884613" y="0"/>
+            <a:ext cx="2971800" cy="458788"/>
+          </a:xfrm>
+          <a:prstGeom prst="rect">
+            <a:avLst/>
+          </a:prstGeom>
+        </p:spPr>
+        <p:txBody>
+          <a:bodyPr vert="horz" lIns="91440" tIns="45720" rIns="91440" bIns="45720" rtlCol="0"/>
+          <a:lstStyle>
+            <a:lvl1pPr algn="r">
+              <a:defRPr sz="1200"/>
+            </a:lvl1pPr>
+          </a:lstStyle>
+          <a:p>
+            <a:fld id="{71A7C331-2A67-4215-90B4-CCD7EEF7ED25}" type="datetimeFigureOut">
+              <a:rPr lang="en-US" smtClean="0"/>
+              <a:t>2/9/2023</a:t>
+            </a:fld>
+            <a:endParaRPr lang="en-US"/>
+          </a:p>
+        </p:txBody>
+      </p:sp>
+      <p:sp>
+        <p:nvSpPr>
+          <p:cNvPr id="4" name="Folienbildplatzhalter 3"/>
+          <p:cNvSpPr>
+            <a:spLocks noGrp="1" noRot="1" noChangeAspect="1"/>
+          </p:cNvSpPr>
+          <p:nvPr>
+            <p:ph type="sldImg" idx="2"/>
+          </p:nvPr>
+        </p:nvSpPr>
+        <p:spPr>
+          <a:xfrm>
+            <a:off x="685800" y="1143000"/>
+            <a:ext cx="5486400" cy="3086100"/>
+          </a:xfrm>
+          <a:prstGeom prst="rect">
+            <a:avLst/>
+          </a:prstGeom>
+          <a:noFill/>
+          <a:ln w="12700">
+            <a:solidFill>
+              <a:prstClr val="black"/>
+            </a:solidFill>
+          </a:ln>
+        </p:spPr>
+        <p:txBody>
+          <a:bodyPr vert="horz" lIns="91440" tIns="45720" rIns="91440" bIns="45720" rtlCol="0" anchor="ctr"/>
+          <a:lstStyle/>
+          <a:p>
+            <a:endParaRPr lang="en-US"/>
+          </a:p>
+        </p:txBody>
+      </p:sp>
+      <p:sp>
+        <p:nvSpPr>
+          <p:cNvPr id="5" name="Notizenplatzhalter 4"/>
+          <p:cNvSpPr>
+            <a:spLocks noGrp="1"/>
+          </p:cNvSpPr>
+          <p:nvPr>
+            <p:ph type="body" sz="quarter" idx="3"/>
+          </p:nvPr>
+        </p:nvSpPr>
+        <p:spPr>
+          <a:xfrm>
+            <a:off x="685800" y="4400550"/>
+            <a:ext cx="5486400" cy="3600450"/>
+          </a:xfrm>
+          <a:prstGeom prst="rect">
+            <a:avLst/>
+          </a:prstGeom>
+        </p:spPr>
+        <p:txBody>
+          <a:bodyPr vert="horz" lIns="91440" tIns="45720" rIns="91440" bIns="45720" rtlCol="0"/>
+          <a:lstStyle/>
+          <a:p>
+            <a:pPr lvl="0"/>
+            <a:r>
+              <a:rPr lang="de-DE"/>
+              <a:t>Mastertextformat bearbeiten</a:t>
+            </a:r>
+          </a:p>
+          <a:p>
+            <a:pPr lvl="1"/>
+            <a:r>
+              <a:rPr lang="de-DE"/>
+              <a:t>Zweite Ebene</a:t>
+            </a:r>
+          </a:p>
+          <a:p>
+            <a:pPr lvl="2"/>
+            <a:r>
+              <a:rPr lang="de-DE"/>
+              <a:t>Dritte Ebene</a:t>
+            </a:r>
+          </a:p>
+          <a:p>
+            <a:pPr lvl="3"/>
+            <a:r>
+              <a:rPr lang="de-DE"/>
+              <a:t>Vierte Ebene</a:t>
+            </a:r>
+          </a:p>
+          <a:p>
+            <a:pPr lvl="4"/>
+            <a:r>
+              <a:rPr lang="de-DE"/>
+              <a:t>Fünfte Ebene</a:t>
+            </a:r>
+            <a:endParaRPr lang="en-US"/>
+          </a:p>
+        </p:txBody>
+      </p:sp>
+      <p:sp>
+        <p:nvSpPr>
+          <p:cNvPr id="6" name="Fußzeilenplatzhalter 5"/>
+          <p:cNvSpPr>
+            <a:spLocks noGrp="1"/>
+          </p:cNvSpPr>
+          <p:nvPr>
+            <p:ph type="ftr" sz="quarter" idx="4"/>
+          </p:nvPr>
+        </p:nvSpPr>
+        <p:spPr>
+          <a:xfrm>
+            <a:off x="0" y="8685213"/>
+            <a:ext cx="2971800" cy="458787"/>
+          </a:xfrm>
+          <a:prstGeom prst="rect">
+            <a:avLst/>
+          </a:prstGeom>
+        </p:spPr>
+        <p:txBody>
+          <a:bodyPr vert="horz" lIns="91440" tIns="45720" rIns="91440" bIns="45720" rtlCol="0" anchor="b"/>
+          <a:lstStyle>
+            <a:lvl1pPr algn="l">
+              <a:defRPr sz="1200"/>
+            </a:lvl1pPr>
+          </a:lstStyle>
+          <a:p>
+            <a:endParaRPr lang="en-US"/>
+          </a:p>
+        </p:txBody>
+      </p:sp>
+      <p:sp>
+        <p:nvSpPr>
+          <p:cNvPr id="7" name="Foliennummernplatzhalter 6"/>
+          <p:cNvSpPr>
+            <a:spLocks noGrp="1"/>
+          </p:cNvSpPr>
+          <p:nvPr>
+            <p:ph type="sldNum" sz="quarter" idx="5"/>
+          </p:nvPr>
+        </p:nvSpPr>
+        <p:spPr>
+          <a:xfrm>
+            <a:off x="3884613" y="8685213"/>
+            <a:ext cx="2971800" cy="458787"/>
+          </a:xfrm>
+          <a:prstGeom prst="rect">
+            <a:avLst/>
+          </a:prstGeom>
+        </p:spPr>
+        <p:txBody>
+          <a:bodyPr vert="horz" lIns="91440" tIns="45720" rIns="91440" bIns="45720" rtlCol="0" anchor="b"/>
+          <a:lstStyle>
+            <a:lvl1pPr algn="r">
+              <a:defRPr sz="1200"/>
+            </a:lvl1pPr>
+          </a:lstStyle>
+          <a:p>
+            <a:fld id="{AEB67254-B115-48E4-9B9E-F142238777E9}" type="slidenum">
+              <a:rPr lang="en-US" smtClean="0"/>
+              <a:t>‹Nr.›</a:t>
+            </a:fld>
+            <a:endParaRPr lang="en-US"/>
+          </a:p>
+        </p:txBody>
+      </p:sp>
+    </p:spTree>
+    <p:extLst>
+      <p:ext uri="{BB962C8B-B14F-4D97-AF65-F5344CB8AC3E}">
+        <p14:creationId xmlns:p14="http://schemas.microsoft.com/office/powerpoint/2010/main" val="2642287604"/>
+      </p:ext>
+    </p:extLst>
+  </p:cSld>
+  <p:clrMap bg1="lt1" tx1="dk1" bg2="lt2" tx2="dk2" accent1="accent1" accent2="accent2" accent3="accent3" accent4="accent4" accent5="accent5" accent6="accent6" hlink="hlink" folHlink="folHlink"/>
+  <p:notesStyle>
+    <a:lvl1pPr marL="0" algn="l" defTabSz="914400" rtl="0" eaLnBrk="1" latinLnBrk="0" hangingPunct="1">
+      <a:defRPr sz="1200" kern="1200">
+        <a:solidFill>
+          <a:schemeClr val="tx1"/>
+        </a:solidFill>
+        <a:latin typeface="+mn-lt"/>
+        <a:ea typeface="+mn-ea"/>
+        <a:cs typeface="+mn-cs"/>
+      </a:defRPr>
+    </a:lvl1pPr>
+    <a:lvl2pPr marL="457200" algn="l" defTabSz="914400" rtl="0" eaLnBrk="1" latinLnBrk="0" hangingPunct="1">
+      <a:defRPr sz="1200" kern="1200">
+        <a:solidFill>
+          <a:schemeClr val="tx1"/>
+        </a:solidFill>
+        <a:latin typeface="+mn-lt"/>
+        <a:ea typeface="+mn-ea"/>
+        <a:cs typeface="+mn-cs"/>
+      </a:defRPr>
+    </a:lvl2pPr>
+    <a:lvl3pPr marL="914400" algn="l" defTabSz="914400" rtl="0" eaLnBrk="1" latinLnBrk="0" hangingPunct="1">
+      <a:defRPr sz="1200" kern="1200">
+        <a:solidFill>
+          <a:schemeClr val="tx1"/>
+        </a:solidFill>
+        <a:latin typeface="+mn-lt"/>
+        <a:ea typeface="+mn-ea"/>
+        <a:cs typeface="+mn-cs"/>
+      </a:defRPr>
+    </a:lvl3pPr>
+    <a:lvl4pPr marL="1371600" algn="l" defTabSz="914400" rtl="0" eaLnBrk="1" latinLnBrk="0" hangingPunct="1">
+      <a:defRPr sz="1200" kern="1200">
+        <a:solidFill>
+          <a:schemeClr val="tx1"/>
+        </a:solidFill>
+        <a:latin typeface="+mn-lt"/>
+        <a:ea typeface="+mn-ea"/>
+        <a:cs typeface="+mn-cs"/>
+      </a:defRPr>
+    </a:lvl4pPr>
+    <a:lvl5pPr marL="1828800" algn="l" defTabSz="914400" rtl="0" eaLnBrk="1" latinLnBrk="0" hangingPunct="1">
+      <a:defRPr sz="1200" kern="1200">
+        <a:solidFill>
+          <a:schemeClr val="tx1"/>
+        </a:solidFill>
+        <a:latin typeface="+mn-lt"/>
+        <a:ea typeface="+mn-ea"/>
+        <a:cs typeface="+mn-cs"/>
+      </a:defRPr>
+    </a:lvl5pPr>
+    <a:lvl6pPr marL="2286000" algn="l" defTabSz="914400" rtl="0" eaLnBrk="1" latinLnBrk="0" hangingPunct="1">
+      <a:defRPr sz="1200" kern="1200">
+        <a:solidFill>
+          <a:schemeClr val="tx1"/>
+        </a:solidFill>
+        <a:latin typeface="+mn-lt"/>
+        <a:ea typeface="+mn-ea"/>
+        <a:cs typeface="+mn-cs"/>
+      </a:defRPr>
+    </a:lvl6pPr>
+    <a:lvl7pPr marL="2743200" algn="l" defTabSz="914400" rtl="0" eaLnBrk="1" latinLnBrk="0" hangingPunct="1">
+      <a:defRPr sz="1200" kern="1200">
+        <a:solidFill>
+          <a:schemeClr val="tx1"/>
+        </a:solidFill>
+        <a:latin typeface="+mn-lt"/>
+        <a:ea typeface="+mn-ea"/>
+        <a:cs typeface="+mn-cs"/>
+      </a:defRPr>
+    </a:lvl7pPr>
+    <a:lvl8pPr marL="3200400" algn="l" defTabSz="914400" rtl="0" eaLnBrk="1" latinLnBrk="0" hangingPunct="1">
+      <a:defRPr sz="1200" kern="1200">
+        <a:solidFill>
+          <a:schemeClr val="tx1"/>
+        </a:solidFill>
+        <a:latin typeface="+mn-lt"/>
+        <a:ea typeface="+mn-ea"/>
+        <a:cs typeface="+mn-cs"/>
+      </a:defRPr>
+    </a:lvl8pPr>
+    <a:lvl9pPr marL="3657600" algn="l" defTabSz="914400" rtl="0" eaLnBrk="1" latinLnBrk="0" hangingPunct="1">
+      <a:defRPr sz="1200" kern="1200">
+        <a:solidFill>
+          <a:schemeClr val="tx1"/>
+        </a:solidFill>
+        <a:latin typeface="+mn-lt"/>
+        <a:ea typeface="+mn-ea"/>
+        <a:cs typeface="+mn-cs"/>
+      </a:defRPr>
+    </a:lvl9pPr>
+  </p:notesStyle>
+</p:notesMaster>
+</file>
+
+<file path=ppt/notesSlides/notesSlide1.xml><?xml version="1.0" encoding="utf-8"?>
+<p:notes xmlns:a="http://schemas.openxmlformats.org/drawingml/2006/main" xmlns:r="http://schemas.openxmlformats.org/officeDocument/2006/relationships" xmlns:p="http://schemas.openxmlformats.org/presentationml/2006/main">
+  <p:cSld>
+    <p:spTree>
+      <p:nvGrpSpPr>
+        <p:cNvPr id="1" name=""/>
+        <p:cNvGrpSpPr/>
+        <p:nvPr/>
+      </p:nvGrpSpPr>
+      <p:grpSpPr>
+        <a:xfrm>
+          <a:off x="0" y="0"/>
+          <a:ext cx="0" cy="0"/>
+          <a:chOff x="0" y="0"/>
+          <a:chExt cx="0" cy="0"/>
+        </a:xfrm>
+      </p:grpSpPr>
+      <p:sp>
+        <p:nvSpPr>
+          <p:cNvPr id="2" name="Folienbildplatzhalter 1"/>
+          <p:cNvSpPr>
+            <a:spLocks noGrp="1" noRot="1" noChangeAspect="1"/>
+          </p:cNvSpPr>
+          <p:nvPr>
+            <p:ph type="sldImg"/>
+          </p:nvPr>
+        </p:nvSpPr>
+        <p:spPr/>
+      </p:sp>
+      <p:sp>
+        <p:nvSpPr>
+          <p:cNvPr id="3" name="Notizenplatzhalter 2"/>
+          <p:cNvSpPr>
+            <a:spLocks noGrp="1"/>
+          </p:cNvSpPr>
+          <p:nvPr>
+            <p:ph type="body" idx="1"/>
+          </p:nvPr>
+        </p:nvSpPr>
+        <p:spPr/>
+        <p:txBody>
+          <a:bodyPr/>
+          <a:lstStyle/>
+          <a:p>
+            <a:endParaRPr lang="en-US" dirty="0"/>
+          </a:p>
+        </p:txBody>
+      </p:sp>
+      <p:sp>
+        <p:nvSpPr>
+          <p:cNvPr id="4" name="Foliennummernplatzhalter 3"/>
+          <p:cNvSpPr>
+            <a:spLocks noGrp="1"/>
+          </p:cNvSpPr>
+          <p:nvPr>
+            <p:ph type="sldNum" sz="quarter" idx="5"/>
+          </p:nvPr>
+        </p:nvSpPr>
+        <p:spPr/>
+        <p:txBody>
+          <a:bodyPr/>
+          <a:lstStyle/>
+          <a:p>
+            <a:fld id="{AEB67254-B115-48E4-9B9E-F142238777E9}" type="slidenum">
+              <a:rPr lang="en-US" smtClean="0"/>
+              <a:t>1</a:t>
+            </a:fld>
+            <a:endParaRPr lang="en-US"/>
+          </a:p>
+        </p:txBody>
+      </p:sp>
+    </p:spTree>
+    <p:extLst>
+      <p:ext uri="{BB962C8B-B14F-4D97-AF65-F5344CB8AC3E}">
+        <p14:creationId xmlns:p14="http://schemas.microsoft.com/office/powerpoint/2010/main" val="15198552"/>
+      </p:ext>
+    </p:extLst>
+  </p:cSld>
+  <p:clrMapOvr>
+    <a:masterClrMapping/>
+  </p:clrMapOvr>
+</p:notes>
 </file>
 
 <file path=ppt/slideLayouts/slideLayout1.xml><?xml version="1.0" encoding="utf-8"?>
@@ -257,7 +699,7 @@
           <a:p>
             <a:fld id="{2F70AC21-F000-4BC0-A4DD-C186B2165839}" type="datetimeFigureOut">
               <a:rPr lang="en-US" smtClean="0"/>
-              <a:t>1/11/2023</a:t>
+              <a:t>2/9/2023</a:t>
             </a:fld>
             <a:endParaRPr lang="en-US"/>
           </a:p>
@@ -457,7 +899,7 @@
           <a:p>
             <a:fld id="{2F70AC21-F000-4BC0-A4DD-C186B2165839}" type="datetimeFigureOut">
               <a:rPr lang="en-US" smtClean="0"/>
-              <a:t>1/11/2023</a:t>
+              <a:t>2/9/2023</a:t>
             </a:fld>
             <a:endParaRPr lang="en-US"/>
           </a:p>
@@ -667,7 +1109,7 @@
           <a:p>
             <a:fld id="{2F70AC21-F000-4BC0-A4DD-C186B2165839}" type="datetimeFigureOut">
               <a:rPr lang="en-US" smtClean="0"/>
-              <a:t>1/11/2023</a:t>
+              <a:t>2/9/2023</a:t>
             </a:fld>
             <a:endParaRPr lang="en-US"/>
           </a:p>
@@ -867,7 +1309,7 @@
           <a:p>
             <a:fld id="{2F70AC21-F000-4BC0-A4DD-C186B2165839}" type="datetimeFigureOut">
               <a:rPr lang="en-US" smtClean="0"/>
-              <a:t>1/11/2023</a:t>
+              <a:t>2/9/2023</a:t>
             </a:fld>
             <a:endParaRPr lang="en-US"/>
           </a:p>
@@ -1143,7 +1585,7 @@
           <a:p>
             <a:fld id="{2F70AC21-F000-4BC0-A4DD-C186B2165839}" type="datetimeFigureOut">
               <a:rPr lang="en-US" smtClean="0"/>
-              <a:t>1/11/2023</a:t>
+              <a:t>2/9/2023</a:t>
             </a:fld>
             <a:endParaRPr lang="en-US"/>
           </a:p>
@@ -1411,7 +1853,7 @@
           <a:p>
             <a:fld id="{2F70AC21-F000-4BC0-A4DD-C186B2165839}" type="datetimeFigureOut">
               <a:rPr lang="en-US" smtClean="0"/>
-              <a:t>1/11/2023</a:t>
+              <a:t>2/9/2023</a:t>
             </a:fld>
             <a:endParaRPr lang="en-US"/>
           </a:p>
@@ -1826,7 +2268,7 @@
           <a:p>
             <a:fld id="{2F70AC21-F000-4BC0-A4DD-C186B2165839}" type="datetimeFigureOut">
               <a:rPr lang="en-US" smtClean="0"/>
-              <a:t>1/11/2023</a:t>
+              <a:t>2/9/2023</a:t>
             </a:fld>
             <a:endParaRPr lang="en-US"/>
           </a:p>
@@ -1968,7 +2410,7 @@
           <a:p>
             <a:fld id="{2F70AC21-F000-4BC0-A4DD-C186B2165839}" type="datetimeFigureOut">
               <a:rPr lang="en-US" smtClean="0"/>
-              <a:t>1/11/2023</a:t>
+              <a:t>2/9/2023</a:t>
             </a:fld>
             <a:endParaRPr lang="en-US"/>
           </a:p>
@@ -2081,7 +2523,7 @@
           <a:p>
             <a:fld id="{2F70AC21-F000-4BC0-A4DD-C186B2165839}" type="datetimeFigureOut">
               <a:rPr lang="en-US" smtClean="0"/>
-              <a:t>1/11/2023</a:t>
+              <a:t>2/9/2023</a:t>
             </a:fld>
             <a:endParaRPr lang="en-US"/>
           </a:p>
@@ -2394,7 +2836,7 @@
           <a:p>
             <a:fld id="{2F70AC21-F000-4BC0-A4DD-C186B2165839}" type="datetimeFigureOut">
               <a:rPr lang="en-US" smtClean="0"/>
-              <a:t>1/11/2023</a:t>
+              <a:t>2/9/2023</a:t>
             </a:fld>
             <a:endParaRPr lang="en-US"/>
           </a:p>
@@ -2683,7 +3125,7 @@
           <a:p>
             <a:fld id="{2F70AC21-F000-4BC0-A4DD-C186B2165839}" type="datetimeFigureOut">
               <a:rPr lang="en-US" smtClean="0"/>
-              <a:t>1/11/2023</a:t>
+              <a:t>2/9/2023</a:t>
             </a:fld>
             <a:endParaRPr lang="en-US"/>
           </a:p>
@@ -2926,7 +3368,7 @@
           <a:p>
             <a:fld id="{2F70AC21-F000-4BC0-A4DD-C186B2165839}" type="datetimeFigureOut">
               <a:rPr lang="en-US" smtClean="0"/>
-              <a:t>1/11/2023</a:t>
+              <a:t>2/9/2023</a:t>
             </a:fld>
             <a:endParaRPr lang="en-US"/>
           </a:p>
@@ -3358,7 +3800,7 @@
           <p:nvPr/>
         </p:nvPicPr>
         <p:blipFill rotWithShape="1">
-          <a:blip r:embed="rId2">
+          <a:blip r:embed="rId3">
             <a:extLst>
               <a:ext uri="{28A0092B-C50C-407E-A947-70E740481C1C}">
                 <a14:useLocalDpi xmlns:a14="http://schemas.microsoft.com/office/drawing/2010/main" val="0"/>
@@ -3378,6 +3820,664 @@
           </a:prstGeom>
         </p:spPr>
       </p:pic>
+      <p:sp>
+        <p:nvSpPr>
+          <p:cNvPr id="29" name="Textfeld 28">
+            <a:extLst>
+              <a:ext uri="{FF2B5EF4-FFF2-40B4-BE49-F238E27FC236}">
+                <a16:creationId xmlns:a16="http://schemas.microsoft.com/office/drawing/2014/main" id="{2868ABFC-070A-4529-98E6-76F4DE7BA2BF}"/>
+              </a:ext>
+            </a:extLst>
+          </p:cNvPr>
+          <p:cNvSpPr txBox="1"/>
+          <p:nvPr/>
+        </p:nvSpPr>
+        <p:spPr>
+          <a:xfrm>
+            <a:off x="2668487" y="2796735"/>
+            <a:ext cx="915635" cy="400110"/>
+          </a:xfrm>
+          <a:prstGeom prst="rect">
+            <a:avLst/>
+          </a:prstGeom>
+          <a:noFill/>
+        </p:spPr>
+        <p:txBody>
+          <a:bodyPr wrap="none" rtlCol="0">
+            <a:spAutoFit/>
+          </a:bodyPr>
+          <a:lstStyle/>
+          <a:p>
+            <a:r>
+              <a:rPr lang="el-GR" sz="2000" b="1" dirty="0">
+                <a:solidFill>
+                  <a:srgbClr val="FF0000"/>
+                </a:solidFill>
+              </a:rPr>
+              <a:t>β</a:t>
+            </a:r>
+            <a:r>
+              <a:rPr lang="de-DE" sz="2000" b="1" dirty="0">
+                <a:solidFill>
+                  <a:srgbClr val="FF0000"/>
+                </a:solidFill>
+              </a:rPr>
+              <a:t> = </a:t>
+            </a:r>
+            <a:r>
+              <a:rPr lang="en-US" sz="2000" b="1" dirty="0">
+                <a:solidFill>
+                  <a:srgbClr val="FF0000"/>
+                </a:solidFill>
+              </a:rPr>
+              <a:t>10°</a:t>
+            </a:r>
+            <a:endParaRPr lang="en-US" sz="2800" b="1" dirty="0">
+              <a:solidFill>
+                <a:srgbClr val="FF0000"/>
+              </a:solidFill>
+            </a:endParaRPr>
+          </a:p>
+        </p:txBody>
+      </p:sp>
+      <p:pic>
+        <p:nvPicPr>
+          <p:cNvPr id="41" name="Grafik 40">
+            <a:extLst>
+              <a:ext uri="{FF2B5EF4-FFF2-40B4-BE49-F238E27FC236}">
+                <a16:creationId xmlns:a16="http://schemas.microsoft.com/office/drawing/2014/main" id="{4CF12E54-0E23-4179-9445-8248BD83332B}"/>
+              </a:ext>
+            </a:extLst>
+          </p:cNvPr>
+          <p:cNvPicPr>
+            <a:picLocks noChangeAspect="1"/>
+          </p:cNvPicPr>
+          <p:nvPr/>
+        </p:nvPicPr>
+        <p:blipFill rotWithShape="1">
+          <a:blip r:embed="rId4">
+            <a:extLst>
+              <a:ext uri="{28A0092B-C50C-407E-A947-70E740481C1C}">
+                <a14:useLocalDpi xmlns:a14="http://schemas.microsoft.com/office/drawing/2010/main" val="0"/>
+              </a:ext>
+            </a:extLst>
+          </a:blip>
+          <a:srcRect t="3864" b="4147"/>
+          <a:stretch/>
+        </p:blipFill>
+        <p:spPr>
+          <a:xfrm>
+            <a:off x="6216346" y="1355180"/>
+            <a:ext cx="5517060" cy="3811624"/>
+          </a:xfrm>
+          <a:prstGeom prst="rect">
+            <a:avLst/>
+          </a:prstGeom>
+        </p:spPr>
+      </p:pic>
+      <p:cxnSp>
+        <p:nvCxnSpPr>
+          <p:cNvPr id="9" name="Gerader Verbinder 8">
+            <a:extLst>
+              <a:ext uri="{FF2B5EF4-FFF2-40B4-BE49-F238E27FC236}">
+                <a16:creationId xmlns:a16="http://schemas.microsoft.com/office/drawing/2014/main" id="{D89678B9-16D0-4119-A1F2-67486B51A9EA}"/>
+              </a:ext>
+            </a:extLst>
+          </p:cNvPr>
+          <p:cNvCxnSpPr>
+            <a:cxnSpLocks/>
+          </p:cNvCxnSpPr>
+          <p:nvPr/>
+        </p:nvCxnSpPr>
+        <p:spPr>
+          <a:xfrm>
+            <a:off x="7513307" y="2444542"/>
+            <a:ext cx="658738" cy="0"/>
+          </a:xfrm>
+          <a:prstGeom prst="line">
+            <a:avLst/>
+          </a:prstGeom>
+          <a:ln w="12700">
+            <a:solidFill>
+              <a:schemeClr val="tx1"/>
+            </a:solidFill>
+            <a:prstDash val="dash"/>
+          </a:ln>
+        </p:spPr>
+        <p:style>
+          <a:lnRef idx="1">
+            <a:schemeClr val="accent2"/>
+          </a:lnRef>
+          <a:fillRef idx="0">
+            <a:schemeClr val="accent2"/>
+          </a:fillRef>
+          <a:effectRef idx="0">
+            <a:schemeClr val="accent2"/>
+          </a:effectRef>
+          <a:fontRef idx="minor">
+            <a:schemeClr val="tx1"/>
+          </a:fontRef>
+        </p:style>
+      </p:cxnSp>
+      <p:cxnSp>
+        <p:nvCxnSpPr>
+          <p:cNvPr id="11" name="Gerader Verbinder 10">
+            <a:extLst>
+              <a:ext uri="{FF2B5EF4-FFF2-40B4-BE49-F238E27FC236}">
+                <a16:creationId xmlns:a16="http://schemas.microsoft.com/office/drawing/2014/main" id="{4BE4D8BC-AB0A-4CF5-B6C5-C6F0E98F87B4}"/>
+              </a:ext>
+            </a:extLst>
+          </p:cNvPr>
+          <p:cNvCxnSpPr>
+            <a:cxnSpLocks/>
+          </p:cNvCxnSpPr>
+          <p:nvPr/>
+        </p:nvCxnSpPr>
+        <p:spPr>
+          <a:xfrm>
+            <a:off x="7513307" y="3630828"/>
+            <a:ext cx="658738" cy="0"/>
+          </a:xfrm>
+          <a:prstGeom prst="line">
+            <a:avLst/>
+          </a:prstGeom>
+          <a:ln w="12700">
+            <a:solidFill>
+              <a:schemeClr val="tx1"/>
+            </a:solidFill>
+            <a:prstDash val="dash"/>
+          </a:ln>
+        </p:spPr>
+        <p:style>
+          <a:lnRef idx="1">
+            <a:schemeClr val="accent2"/>
+          </a:lnRef>
+          <a:fillRef idx="0">
+            <a:schemeClr val="accent2"/>
+          </a:fillRef>
+          <a:effectRef idx="0">
+            <a:schemeClr val="accent2"/>
+          </a:effectRef>
+          <a:fontRef idx="minor">
+            <a:schemeClr val="tx1"/>
+          </a:fontRef>
+        </p:style>
+      </p:cxnSp>
+      <p:cxnSp>
+        <p:nvCxnSpPr>
+          <p:cNvPr id="4" name="Gerader Verbinder 3">
+            <a:extLst>
+              <a:ext uri="{FF2B5EF4-FFF2-40B4-BE49-F238E27FC236}">
+                <a16:creationId xmlns:a16="http://schemas.microsoft.com/office/drawing/2014/main" id="{09B75575-E28E-440E-9FC6-ED146D9DD45D}"/>
+              </a:ext>
+            </a:extLst>
+          </p:cNvPr>
+          <p:cNvCxnSpPr>
+            <a:cxnSpLocks/>
+          </p:cNvCxnSpPr>
+          <p:nvPr/>
+        </p:nvCxnSpPr>
+        <p:spPr>
+          <a:xfrm>
+            <a:off x="7789808" y="2447636"/>
+            <a:ext cx="0" cy="1183192"/>
+          </a:xfrm>
+          <a:prstGeom prst="line">
+            <a:avLst/>
+          </a:prstGeom>
+          <a:ln w="12700">
+            <a:solidFill>
+              <a:schemeClr val="tx1"/>
+            </a:solidFill>
+            <a:prstDash val="dash"/>
+            <a:headEnd type="triangle"/>
+            <a:tailEnd type="triangle"/>
+          </a:ln>
+        </p:spPr>
+        <p:style>
+          <a:lnRef idx="1">
+            <a:schemeClr val="accent2"/>
+          </a:lnRef>
+          <a:fillRef idx="0">
+            <a:schemeClr val="accent2"/>
+          </a:fillRef>
+          <a:effectRef idx="0">
+            <a:schemeClr val="accent2"/>
+          </a:effectRef>
+          <a:fontRef idx="minor">
+            <a:schemeClr val="tx1"/>
+          </a:fontRef>
+        </p:style>
+      </p:cxnSp>
+      <p:sp>
+        <p:nvSpPr>
+          <p:cNvPr id="15" name="Textfeld 14">
+            <a:extLst>
+              <a:ext uri="{FF2B5EF4-FFF2-40B4-BE49-F238E27FC236}">
+                <a16:creationId xmlns:a16="http://schemas.microsoft.com/office/drawing/2014/main" id="{9B9D6038-7FFD-49FD-BB43-725F1900E98E}"/>
+              </a:ext>
+            </a:extLst>
+          </p:cNvPr>
+          <p:cNvSpPr txBox="1"/>
+          <p:nvPr/>
+        </p:nvSpPr>
+        <p:spPr>
+          <a:xfrm>
+            <a:off x="7518293" y="2956755"/>
+            <a:ext cx="322524" cy="400110"/>
+          </a:xfrm>
+          <a:prstGeom prst="rect">
+            <a:avLst/>
+          </a:prstGeom>
+          <a:noFill/>
+        </p:spPr>
+        <p:txBody>
+          <a:bodyPr wrap="none" rtlCol="0">
+            <a:spAutoFit/>
+          </a:bodyPr>
+          <a:lstStyle/>
+          <a:p>
+            <a:r>
+              <a:rPr lang="de-DE" sz="2000" b="1" dirty="0">
+                <a:solidFill>
+                  <a:srgbClr val="FF0000"/>
+                </a:solidFill>
+              </a:rPr>
+              <a:t>h</a:t>
+            </a:r>
+            <a:endParaRPr lang="en-US" sz="2800" b="1" dirty="0">
+              <a:solidFill>
+                <a:srgbClr val="FF0000"/>
+              </a:solidFill>
+            </a:endParaRPr>
+          </a:p>
+        </p:txBody>
+      </p:sp>
+      <p:sp>
+        <p:nvSpPr>
+          <p:cNvPr id="12" name="Bogen 11">
+            <a:extLst>
+              <a:ext uri="{FF2B5EF4-FFF2-40B4-BE49-F238E27FC236}">
+                <a16:creationId xmlns:a16="http://schemas.microsoft.com/office/drawing/2014/main" id="{7E0A5B7B-E610-451E-B889-AD322C08894E}"/>
+              </a:ext>
+            </a:extLst>
+          </p:cNvPr>
+          <p:cNvSpPr/>
+          <p:nvPr/>
+        </p:nvSpPr>
+        <p:spPr>
+          <a:xfrm>
+            <a:off x="-417332" y="3020256"/>
+            <a:ext cx="6598866" cy="1450144"/>
+          </a:xfrm>
+          <a:prstGeom prst="arc">
+            <a:avLst>
+              <a:gd name="adj1" fmla="val 20108638"/>
+              <a:gd name="adj2" fmla="val 9811877"/>
+            </a:avLst>
+          </a:prstGeom>
+          <a:ln w="12700">
+            <a:solidFill>
+              <a:schemeClr val="tx1"/>
+            </a:solidFill>
+            <a:prstDash val="dash"/>
+          </a:ln>
+        </p:spPr>
+        <p:style>
+          <a:lnRef idx="1">
+            <a:schemeClr val="accent2"/>
+          </a:lnRef>
+          <a:fillRef idx="0">
+            <a:schemeClr val="accent2"/>
+          </a:fillRef>
+          <a:effectRef idx="0">
+            <a:schemeClr val="accent2"/>
+          </a:effectRef>
+          <a:fontRef idx="minor">
+            <a:schemeClr val="tx1"/>
+          </a:fontRef>
+        </p:style>
+        <p:txBody>
+          <a:bodyPr rtlCol="0" anchor="ctr"/>
+          <a:lstStyle/>
+          <a:p>
+            <a:pPr algn="ctr"/>
+            <a:endParaRPr lang="en-US"/>
+          </a:p>
+        </p:txBody>
+      </p:sp>
+      <p:cxnSp>
+        <p:nvCxnSpPr>
+          <p:cNvPr id="20" name="Gerader Verbinder 19">
+            <a:extLst>
+              <a:ext uri="{FF2B5EF4-FFF2-40B4-BE49-F238E27FC236}">
+                <a16:creationId xmlns:a16="http://schemas.microsoft.com/office/drawing/2014/main" id="{5FA31231-E77E-45FD-B835-6F1AAEC5C839}"/>
+              </a:ext>
+            </a:extLst>
+          </p:cNvPr>
+          <p:cNvCxnSpPr>
+            <a:cxnSpLocks/>
+          </p:cNvCxnSpPr>
+          <p:nvPr/>
+        </p:nvCxnSpPr>
+        <p:spPr>
+          <a:xfrm>
+            <a:off x="4897881" y="3993388"/>
+            <a:ext cx="632969" cy="191262"/>
+          </a:xfrm>
+          <a:prstGeom prst="line">
+            <a:avLst/>
+          </a:prstGeom>
+          <a:ln w="12700">
+            <a:solidFill>
+              <a:schemeClr val="tx1"/>
+            </a:solidFill>
+            <a:prstDash val="dash"/>
+            <a:headEnd type="none"/>
+            <a:tailEnd type="triangle"/>
+          </a:ln>
+        </p:spPr>
+        <p:style>
+          <a:lnRef idx="1">
+            <a:schemeClr val="accent2"/>
+          </a:lnRef>
+          <a:fillRef idx="0">
+            <a:schemeClr val="accent2"/>
+          </a:fillRef>
+          <a:effectRef idx="0">
+            <a:schemeClr val="accent2"/>
+          </a:effectRef>
+          <a:fontRef idx="minor">
+            <a:schemeClr val="tx1"/>
+          </a:fontRef>
+        </p:style>
+      </p:cxnSp>
+      <p:sp>
+        <p:nvSpPr>
+          <p:cNvPr id="23" name="Freihandform: Form 22">
+            <a:extLst>
+              <a:ext uri="{FF2B5EF4-FFF2-40B4-BE49-F238E27FC236}">
+                <a16:creationId xmlns:a16="http://schemas.microsoft.com/office/drawing/2014/main" id="{926EDE22-04F8-4A1A-A714-90EC05E77F63}"/>
+              </a:ext>
+            </a:extLst>
+          </p:cNvPr>
+          <p:cNvSpPr/>
+          <p:nvPr/>
+        </p:nvSpPr>
+        <p:spPr>
+          <a:xfrm>
+            <a:off x="3721100" y="2346325"/>
+            <a:ext cx="2489200" cy="1380871"/>
+          </a:xfrm>
+          <a:custGeom>
+            <a:avLst/>
+            <a:gdLst>
+              <a:gd name="connsiteX0" fmla="*/ 0 w 2489200"/>
+              <a:gd name="connsiteY0" fmla="*/ 0 h 1380871"/>
+              <a:gd name="connsiteX1" fmla="*/ 165100 w 2489200"/>
+              <a:gd name="connsiteY1" fmla="*/ 393700 h 1380871"/>
+              <a:gd name="connsiteX2" fmla="*/ 501650 w 2489200"/>
+              <a:gd name="connsiteY2" fmla="*/ 727075 h 1380871"/>
+              <a:gd name="connsiteX3" fmla="*/ 876300 w 2489200"/>
+              <a:gd name="connsiteY3" fmla="*/ 962025 h 1380871"/>
+              <a:gd name="connsiteX4" fmla="*/ 1190625 w 2489200"/>
+              <a:gd name="connsiteY4" fmla="*/ 1114425 h 1380871"/>
+              <a:gd name="connsiteX5" fmla="*/ 1679575 w 2489200"/>
+              <a:gd name="connsiteY5" fmla="*/ 1257300 h 1380871"/>
+              <a:gd name="connsiteX6" fmla="*/ 2266950 w 2489200"/>
+              <a:gd name="connsiteY6" fmla="*/ 1365250 h 1380871"/>
+              <a:gd name="connsiteX7" fmla="*/ 2489200 w 2489200"/>
+              <a:gd name="connsiteY7" fmla="*/ 1377950 h 1380871"/>
+            </a:gdLst>
+            <a:ahLst/>
+            <a:cxnLst>
+              <a:cxn ang="0">
+                <a:pos x="connsiteX0" y="connsiteY0"/>
+              </a:cxn>
+              <a:cxn ang="0">
+                <a:pos x="connsiteX1" y="connsiteY1"/>
+              </a:cxn>
+              <a:cxn ang="0">
+                <a:pos x="connsiteX2" y="connsiteY2"/>
+              </a:cxn>
+              <a:cxn ang="0">
+                <a:pos x="connsiteX3" y="connsiteY3"/>
+              </a:cxn>
+              <a:cxn ang="0">
+                <a:pos x="connsiteX4" y="connsiteY4"/>
+              </a:cxn>
+              <a:cxn ang="0">
+                <a:pos x="connsiteX5" y="connsiteY5"/>
+              </a:cxn>
+              <a:cxn ang="0">
+                <a:pos x="connsiteX6" y="connsiteY6"/>
+              </a:cxn>
+              <a:cxn ang="0">
+                <a:pos x="connsiteX7" y="connsiteY7"/>
+              </a:cxn>
+            </a:cxnLst>
+            <a:rect l="l" t="t" r="r" b="b"/>
+            <a:pathLst>
+              <a:path w="2489200" h="1380871">
+                <a:moveTo>
+                  <a:pt x="0" y="0"/>
+                </a:moveTo>
+                <a:cubicBezTo>
+                  <a:pt x="40746" y="136260"/>
+                  <a:pt x="81492" y="272521"/>
+                  <a:pt x="165100" y="393700"/>
+                </a:cubicBezTo>
+                <a:cubicBezTo>
+                  <a:pt x="248708" y="514879"/>
+                  <a:pt x="383117" y="632354"/>
+                  <a:pt x="501650" y="727075"/>
+                </a:cubicBezTo>
+                <a:cubicBezTo>
+                  <a:pt x="620183" y="821796"/>
+                  <a:pt x="761471" y="897467"/>
+                  <a:pt x="876300" y="962025"/>
+                </a:cubicBezTo>
+                <a:cubicBezTo>
+                  <a:pt x="991129" y="1026583"/>
+                  <a:pt x="1056746" y="1065213"/>
+                  <a:pt x="1190625" y="1114425"/>
+                </a:cubicBezTo>
+                <a:cubicBezTo>
+                  <a:pt x="1324504" y="1163637"/>
+                  <a:pt x="1500188" y="1215496"/>
+                  <a:pt x="1679575" y="1257300"/>
+                </a:cubicBezTo>
+                <a:cubicBezTo>
+                  <a:pt x="1858963" y="1299104"/>
+                  <a:pt x="2132013" y="1345142"/>
+                  <a:pt x="2266950" y="1365250"/>
+                </a:cubicBezTo>
+                <a:cubicBezTo>
+                  <a:pt x="2401888" y="1385358"/>
+                  <a:pt x="2445544" y="1381654"/>
+                  <a:pt x="2489200" y="1377950"/>
+                </a:cubicBezTo>
+              </a:path>
+            </a:pathLst>
+          </a:custGeom>
+          <a:noFill/>
+          <a:ln w="19050"/>
+        </p:spPr>
+        <p:style>
+          <a:lnRef idx="2">
+            <a:schemeClr val="accent1">
+              <a:shade val="50000"/>
+            </a:schemeClr>
+          </a:lnRef>
+          <a:fillRef idx="1">
+            <a:schemeClr val="accent1"/>
+          </a:fillRef>
+          <a:effectRef idx="0">
+            <a:schemeClr val="accent1"/>
+          </a:effectRef>
+          <a:fontRef idx="minor">
+            <a:schemeClr val="lt1"/>
+          </a:fontRef>
+        </p:style>
+        <p:txBody>
+          <a:bodyPr rtlCol="0" anchor="ctr"/>
+          <a:lstStyle/>
+          <a:p>
+            <a:pPr algn="ctr"/>
+            <a:endParaRPr lang="en-US"/>
+          </a:p>
+        </p:txBody>
+      </p:sp>
+      <p:sp>
+        <p:nvSpPr>
+          <p:cNvPr id="34" name="Textfeld 33">
+            <a:extLst>
+              <a:ext uri="{FF2B5EF4-FFF2-40B4-BE49-F238E27FC236}">
+                <a16:creationId xmlns:a16="http://schemas.microsoft.com/office/drawing/2014/main" id="{183E8954-1D1C-43B9-9B1B-8F5D07F90DF0}"/>
+              </a:ext>
+            </a:extLst>
+          </p:cNvPr>
+          <p:cNvSpPr txBox="1"/>
+          <p:nvPr/>
+        </p:nvSpPr>
+        <p:spPr>
+          <a:xfrm>
+            <a:off x="4972622" y="3722780"/>
+            <a:ext cx="362600" cy="400110"/>
+          </a:xfrm>
+          <a:prstGeom prst="rect">
+            <a:avLst/>
+          </a:prstGeom>
+          <a:noFill/>
+        </p:spPr>
+        <p:txBody>
+          <a:bodyPr wrap="none" rtlCol="0">
+            <a:spAutoFit/>
+          </a:bodyPr>
+          <a:lstStyle/>
+          <a:p>
+            <a:r>
+              <a:rPr lang="de-DE" sz="2000" b="1" dirty="0">
+                <a:solidFill>
+                  <a:srgbClr val="FF0000"/>
+                </a:solidFill>
+              </a:rPr>
+              <a:t>r</a:t>
+            </a:r>
+            <a:r>
+              <a:rPr lang="de-DE" sz="2000" b="1" baseline="-25000" dirty="0">
+                <a:solidFill>
+                  <a:srgbClr val="FF0000"/>
+                </a:solidFill>
+              </a:rPr>
+              <a:t>1</a:t>
+            </a:r>
+            <a:endParaRPr lang="en-US" sz="2800" b="1" dirty="0">
+              <a:solidFill>
+                <a:srgbClr val="FF0000"/>
+              </a:solidFill>
+            </a:endParaRPr>
+          </a:p>
+        </p:txBody>
+      </p:sp>
+      <p:cxnSp>
+        <p:nvCxnSpPr>
+          <p:cNvPr id="35" name="Gerader Verbinder 34">
+            <a:extLst>
+              <a:ext uri="{FF2B5EF4-FFF2-40B4-BE49-F238E27FC236}">
+                <a16:creationId xmlns:a16="http://schemas.microsoft.com/office/drawing/2014/main" id="{1B59478B-8220-4345-8A2B-48C1D3CDB717}"/>
+              </a:ext>
+            </a:extLst>
+          </p:cNvPr>
+          <p:cNvCxnSpPr>
+            <a:cxnSpLocks/>
+          </p:cNvCxnSpPr>
+          <p:nvPr/>
+        </p:nvCxnSpPr>
+        <p:spPr>
+          <a:xfrm flipH="1">
+            <a:off x="3868082" y="2464538"/>
+            <a:ext cx="287247" cy="218752"/>
+          </a:xfrm>
+          <a:prstGeom prst="line">
+            <a:avLst/>
+          </a:prstGeom>
+          <a:ln w="12700">
+            <a:solidFill>
+              <a:schemeClr val="tx1"/>
+            </a:solidFill>
+            <a:prstDash val="dash"/>
+            <a:headEnd type="none"/>
+            <a:tailEnd type="triangle"/>
+          </a:ln>
+        </p:spPr>
+        <p:style>
+          <a:lnRef idx="1">
+            <a:schemeClr val="accent2"/>
+          </a:lnRef>
+          <a:fillRef idx="0">
+            <a:schemeClr val="accent2"/>
+          </a:fillRef>
+          <a:effectRef idx="0">
+            <a:schemeClr val="accent2"/>
+          </a:effectRef>
+          <a:fontRef idx="minor">
+            <a:schemeClr val="tx1"/>
+          </a:fontRef>
+        </p:style>
+      </p:cxnSp>
+      <p:sp>
+        <p:nvSpPr>
+          <p:cNvPr id="38" name="Textfeld 37">
+            <a:extLst>
+              <a:ext uri="{FF2B5EF4-FFF2-40B4-BE49-F238E27FC236}">
+                <a16:creationId xmlns:a16="http://schemas.microsoft.com/office/drawing/2014/main" id="{EE7BF362-BC58-4FB7-B5D7-2A9030842927}"/>
+              </a:ext>
+            </a:extLst>
+          </p:cNvPr>
+          <p:cNvSpPr txBox="1"/>
+          <p:nvPr/>
+        </p:nvSpPr>
+        <p:spPr>
+          <a:xfrm>
+            <a:off x="3807273" y="2140827"/>
+            <a:ext cx="362600" cy="400110"/>
+          </a:xfrm>
+          <a:prstGeom prst="rect">
+            <a:avLst/>
+          </a:prstGeom>
+          <a:noFill/>
+        </p:spPr>
+        <p:txBody>
+          <a:bodyPr wrap="none" rtlCol="0">
+            <a:spAutoFit/>
+          </a:bodyPr>
+          <a:lstStyle/>
+          <a:p>
+            <a:r>
+              <a:rPr lang="de-DE" sz="2000" b="1" dirty="0">
+                <a:solidFill>
+                  <a:srgbClr val="FF0000"/>
+                </a:solidFill>
+              </a:rPr>
+              <a:t>r</a:t>
+            </a:r>
+            <a:r>
+              <a:rPr lang="de-DE" sz="2000" b="1" baseline="-25000" dirty="0">
+                <a:solidFill>
+                  <a:srgbClr val="FF0000"/>
+                </a:solidFill>
+              </a:rPr>
+              <a:t>2</a:t>
+            </a:r>
+            <a:endParaRPr lang="en-US" sz="2800" b="1" dirty="0">
+              <a:solidFill>
+                <a:srgbClr val="FF0000"/>
+              </a:solidFill>
+            </a:endParaRPr>
+          </a:p>
+        </p:txBody>
+      </p:sp>
       <p:cxnSp>
         <p:nvCxnSpPr>
           <p:cNvPr id="27" name="Gerader Verbinder 26">
@@ -3395,14 +4495,14 @@
         <p:spPr>
           <a:xfrm>
             <a:off x="3720006" y="2313818"/>
-            <a:ext cx="296153" cy="1679570"/>
+            <a:ext cx="159853" cy="906574"/>
           </a:xfrm>
           <a:prstGeom prst="line">
             <a:avLst/>
           </a:prstGeom>
           <a:ln w="12700">
             <a:solidFill>
-              <a:srgbClr val="FF0000"/>
+              <a:schemeClr val="tx1"/>
             </a:solidFill>
             <a:prstDash val="dash"/>
           </a:ln>
@@ -3438,15 +4538,15 @@
         </p:nvCxnSpPr>
         <p:spPr>
           <a:xfrm flipV="1">
-            <a:off x="3694962" y="1355180"/>
-            <a:ext cx="12993" cy="2661068"/>
+            <a:off x="3704780" y="1355182"/>
+            <a:ext cx="0" cy="1991268"/>
           </a:xfrm>
           <a:prstGeom prst="line">
             <a:avLst/>
           </a:prstGeom>
           <a:ln w="12700">
             <a:solidFill>
-              <a:srgbClr val="FF0000"/>
+              <a:schemeClr val="tx1"/>
             </a:solidFill>
             <a:prstDash val="dash"/>
           </a:ln>
@@ -3466,12 +4566,148 @@
           </a:fontRef>
         </p:style>
       </p:cxnSp>
-      <p:sp>
-        <p:nvSpPr>
-          <p:cNvPr id="29" name="Textfeld 28">
-            <a:extLst>
-              <a:ext uri="{FF2B5EF4-FFF2-40B4-BE49-F238E27FC236}">
-                <a16:creationId xmlns:a16="http://schemas.microsoft.com/office/drawing/2014/main" id="{2868ABFC-070A-4529-98E6-76F4DE7BA2BF}"/>
+      <p:cxnSp>
+        <p:nvCxnSpPr>
+          <p:cNvPr id="42" name="Gerader Verbinder 41">
+            <a:extLst>
+              <a:ext uri="{FF2B5EF4-FFF2-40B4-BE49-F238E27FC236}">
+                <a16:creationId xmlns:a16="http://schemas.microsoft.com/office/drawing/2014/main" id="{0D78074A-3F8A-4FE9-8620-F60DA2A6A302}"/>
+              </a:ext>
+            </a:extLst>
+          </p:cNvPr>
+          <p:cNvCxnSpPr>
+            <a:cxnSpLocks/>
+          </p:cNvCxnSpPr>
+          <p:nvPr/>
+        </p:nvCxnSpPr>
+        <p:spPr>
+          <a:xfrm>
+            <a:off x="3699179" y="3736663"/>
+            <a:ext cx="360000" cy="0"/>
+          </a:xfrm>
+          <a:prstGeom prst="line">
+            <a:avLst/>
+          </a:prstGeom>
+          <a:ln w="12700">
+            <a:solidFill>
+              <a:schemeClr val="tx1"/>
+            </a:solidFill>
+            <a:prstDash val="solid"/>
+            <a:headEnd type="none"/>
+            <a:tailEnd type="triangle"/>
+          </a:ln>
+        </p:spPr>
+        <p:style>
+          <a:lnRef idx="1">
+            <a:schemeClr val="accent2"/>
+          </a:lnRef>
+          <a:fillRef idx="0">
+            <a:schemeClr val="accent2"/>
+          </a:fillRef>
+          <a:effectRef idx="0">
+            <a:schemeClr val="accent2"/>
+          </a:effectRef>
+          <a:fontRef idx="minor">
+            <a:schemeClr val="tx1"/>
+          </a:fontRef>
+        </p:style>
+      </p:cxnSp>
+      <p:cxnSp>
+        <p:nvCxnSpPr>
+          <p:cNvPr id="47" name="Gerader Verbinder 46">
+            <a:extLst>
+              <a:ext uri="{FF2B5EF4-FFF2-40B4-BE49-F238E27FC236}">
+                <a16:creationId xmlns:a16="http://schemas.microsoft.com/office/drawing/2014/main" id="{61D243FA-E475-4D07-B3AF-904E3F350EEA}"/>
+              </a:ext>
+            </a:extLst>
+          </p:cNvPr>
+          <p:cNvCxnSpPr>
+            <a:cxnSpLocks/>
+          </p:cNvCxnSpPr>
+          <p:nvPr/>
+        </p:nvCxnSpPr>
+        <p:spPr>
+          <a:xfrm flipV="1">
+            <a:off x="3705833" y="3381829"/>
+            <a:ext cx="0" cy="360000"/>
+          </a:xfrm>
+          <a:prstGeom prst="line">
+            <a:avLst/>
+          </a:prstGeom>
+          <a:ln w="12700">
+            <a:solidFill>
+              <a:schemeClr val="tx1"/>
+            </a:solidFill>
+            <a:prstDash val="solid"/>
+            <a:headEnd type="none"/>
+            <a:tailEnd type="triangle"/>
+          </a:ln>
+        </p:spPr>
+        <p:style>
+          <a:lnRef idx="1">
+            <a:schemeClr val="accent2"/>
+          </a:lnRef>
+          <a:fillRef idx="0">
+            <a:schemeClr val="accent2"/>
+          </a:fillRef>
+          <a:effectRef idx="0">
+            <a:schemeClr val="accent2"/>
+          </a:effectRef>
+          <a:fontRef idx="minor">
+            <a:schemeClr val="tx1"/>
+          </a:fontRef>
+        </p:style>
+      </p:cxnSp>
+      <p:cxnSp>
+        <p:nvCxnSpPr>
+          <p:cNvPr id="54" name="Gerader Verbinder 53">
+            <a:extLst>
+              <a:ext uri="{FF2B5EF4-FFF2-40B4-BE49-F238E27FC236}">
+                <a16:creationId xmlns:a16="http://schemas.microsoft.com/office/drawing/2014/main" id="{40AB63F3-794C-44B4-B72E-DEEF9DF43ECE}"/>
+              </a:ext>
+            </a:extLst>
+          </p:cNvPr>
+          <p:cNvCxnSpPr>
+            <a:cxnSpLocks/>
+          </p:cNvCxnSpPr>
+          <p:nvPr/>
+        </p:nvCxnSpPr>
+        <p:spPr>
+          <a:xfrm>
+            <a:off x="4086225" y="3736720"/>
+            <a:ext cx="2124075" cy="0"/>
+          </a:xfrm>
+          <a:prstGeom prst="line">
+            <a:avLst/>
+          </a:prstGeom>
+          <a:ln w="12700">
+            <a:solidFill>
+              <a:schemeClr val="tx1"/>
+            </a:solidFill>
+            <a:prstDash val="dash"/>
+          </a:ln>
+        </p:spPr>
+        <p:style>
+          <a:lnRef idx="1">
+            <a:schemeClr val="accent2"/>
+          </a:lnRef>
+          <a:fillRef idx="0">
+            <a:schemeClr val="accent2"/>
+          </a:fillRef>
+          <a:effectRef idx="0">
+            <a:schemeClr val="accent2"/>
+          </a:effectRef>
+          <a:fontRef idx="minor">
+            <a:schemeClr val="tx1"/>
+          </a:fontRef>
+        </p:style>
+      </p:cxnSp>
+      <p:sp>
+        <p:nvSpPr>
+          <p:cNvPr id="60" name="Textfeld 59">
+            <a:extLst>
+              <a:ext uri="{FF2B5EF4-FFF2-40B4-BE49-F238E27FC236}">
+                <a16:creationId xmlns:a16="http://schemas.microsoft.com/office/drawing/2014/main" id="{8F15DFC4-426F-4990-BBE5-DC8E1BF7E324}"/>
               </a:ext>
             </a:extLst>
           </p:cNvPr>
@@ -3480,8 +4716,8 @@
         </p:nvSpPr>
         <p:spPr>
           <a:xfrm>
-            <a:off x="3183668" y="3022574"/>
-            <a:ext cx="428322" cy="307777"/>
+            <a:off x="3790193" y="3640352"/>
+            <a:ext cx="303288" cy="400110"/>
           </a:xfrm>
           <a:prstGeom prst="rect">
             <a:avLst/>
@@ -3495,18 +4731,46 @@
           <a:lstStyle/>
           <a:p>
             <a:r>
-              <a:rPr lang="en-US" sz="1400" b="1" dirty="0">
-                <a:solidFill>
-                  <a:srgbClr val="FF0000"/>
-                </a:solidFill>
-              </a:rPr>
-              <a:t>10°</a:t>
-            </a:r>
-            <a:endParaRPr lang="en-US" b="1" dirty="0">
-              <a:solidFill>
-                <a:srgbClr val="FF0000"/>
-              </a:solidFill>
-            </a:endParaRPr>
+              <a:rPr lang="de-DE" sz="2000" b="1" dirty="0"/>
+              <a:t>x</a:t>
+            </a:r>
+            <a:endParaRPr lang="en-US" sz="2800" b="1" dirty="0"/>
+          </a:p>
+        </p:txBody>
+      </p:sp>
+      <p:sp>
+        <p:nvSpPr>
+          <p:cNvPr id="61" name="Textfeld 60">
+            <a:extLst>
+              <a:ext uri="{FF2B5EF4-FFF2-40B4-BE49-F238E27FC236}">
+                <a16:creationId xmlns:a16="http://schemas.microsoft.com/office/drawing/2014/main" id="{AFFC56AD-B662-4B91-B4A5-410D7377347C}"/>
+              </a:ext>
+            </a:extLst>
+          </p:cNvPr>
+          <p:cNvSpPr txBox="1"/>
+          <p:nvPr/>
+        </p:nvSpPr>
+        <p:spPr>
+          <a:xfrm>
+            <a:off x="3441398" y="3278874"/>
+            <a:ext cx="287258" cy="400110"/>
+          </a:xfrm>
+          <a:prstGeom prst="rect">
+            <a:avLst/>
+          </a:prstGeom>
+          <a:noFill/>
+        </p:spPr>
+        <p:txBody>
+          <a:bodyPr wrap="none" rtlCol="0">
+            <a:spAutoFit/>
+          </a:bodyPr>
+          <a:lstStyle/>
+          <a:p>
+            <a:r>
+              <a:rPr lang="de-DE" sz="2000" b="1" dirty="0"/>
+              <a:t>z</a:t>
+            </a:r>
+            <a:endParaRPr lang="en-US" sz="2800" b="1" dirty="0"/>
           </a:p>
         </p:txBody>
       </p:sp>
@@ -3524,7 +4788,7 @@
         </p:nvSpPr>
         <p:spPr>
           <a:xfrm>
-            <a:off x="3568578" y="3020255"/>
+            <a:off x="3565600" y="2822196"/>
             <a:ext cx="199760" cy="215679"/>
           </a:xfrm>
           <a:custGeom>
@@ -3569,7 +4833,7 @@
             </a:pathLst>
           </a:custGeom>
           <a:noFill/>
-          <a:ln>
+          <a:ln w="19050">
             <a:solidFill>
               <a:srgbClr val="FF0000"/>
             </a:solidFill>
@@ -3605,42 +4869,6 @@
           </a:p>
         </p:txBody>
       </p:sp>
-      <p:pic>
-        <p:nvPicPr>
-          <p:cNvPr id="41" name="Grafik 40">
-            <a:extLst>
-              <a:ext uri="{FF2B5EF4-FFF2-40B4-BE49-F238E27FC236}">
-                <a16:creationId xmlns:a16="http://schemas.microsoft.com/office/drawing/2014/main" id="{4CF12E54-0E23-4179-9445-8248BD83332B}"/>
-              </a:ext>
-            </a:extLst>
-          </p:cNvPr>
-          <p:cNvPicPr>
-            <a:picLocks noChangeAspect="1"/>
-          </p:cNvPicPr>
-          <p:nvPr/>
-        </p:nvPicPr>
-        <p:blipFill>
-          <a:blip r:embed="rId3">
-            <a:extLst>
-              <a:ext uri="{28A0092B-C50C-407E-A947-70E740481C1C}">
-                <a14:useLocalDpi xmlns:a14="http://schemas.microsoft.com/office/drawing/2010/main" val="0"/>
-              </a:ext>
-            </a:extLst>
-          </a:blip>
-          <a:stretch>
-            <a:fillRect/>
-          </a:stretch>
-        </p:blipFill>
-        <p:spPr>
-          <a:xfrm>
-            <a:off x="6212703" y="1195075"/>
-            <a:ext cx="5252271" cy="3939203"/>
-          </a:xfrm>
-          <a:prstGeom prst="rect">
-            <a:avLst/>
-          </a:prstGeom>
-        </p:spPr>
-      </p:pic>
     </p:spTree>
     <p:extLst>
       <p:ext uri="{BB962C8B-B14F-4D97-AF65-F5344CB8AC3E}">
@@ -4239,4 +5467,299 @@
     </a:ext>
   </a:extLst>
 </a:theme>
+</file>
+
+<file path=ppt/theme/theme2.xml><?xml version="1.0" encoding="utf-8"?>
+<a:theme xmlns:a="http://schemas.openxmlformats.org/drawingml/2006/main" name="Office">
+  <a:themeElements>
+    <a:clrScheme name="Office">
+      <a:dk1>
+        <a:sysClr val="windowText" lastClr="000000"/>
+      </a:dk1>
+      <a:lt1>
+        <a:sysClr val="window" lastClr="FFFFFF"/>
+      </a:lt1>
+      <a:dk2>
+        <a:srgbClr val="44546A"/>
+      </a:dk2>
+      <a:lt2>
+        <a:srgbClr val="E7E6E6"/>
+      </a:lt2>
+      <a:accent1>
+        <a:srgbClr val="4472C4"/>
+      </a:accent1>
+      <a:accent2>
+        <a:srgbClr val="ED7D31"/>
+      </a:accent2>
+      <a:accent3>
+        <a:srgbClr val="A5A5A5"/>
+      </a:accent3>
+      <a:accent4>
+        <a:srgbClr val="FFC000"/>
+      </a:accent4>
+      <a:accent5>
+        <a:srgbClr val="5B9BD5"/>
+      </a:accent5>
+      <a:accent6>
+        <a:srgbClr val="70AD47"/>
+      </a:accent6>
+      <a:hlink>
+        <a:srgbClr val="0563C1"/>
+      </a:hlink>
+      <a:folHlink>
+        <a:srgbClr val="954F72"/>
+      </a:folHlink>
+    </a:clrScheme>
+    <a:fontScheme name="Office">
+      <a:majorFont>
+        <a:latin typeface="Calibri Light" panose="020F0302020204030204"/>
+        <a:ea typeface=""/>
+        <a:cs typeface=""/>
+        <a:font script="Jpan" typeface="游ゴシック Light"/>
+        <a:font script="Hang" typeface="맑은 고딕"/>
+        <a:font script="Hans" typeface="等线 Light"/>
+        <a:font script="Hant" typeface="新細明體"/>
+        <a:font script="Arab" typeface="Times New Roman"/>
+        <a:font script="Hebr" typeface="Times New Roman"/>
+        <a:font script="Thai" typeface="Angsana New"/>
+        <a:font script="Ethi" typeface="Nyala"/>
+        <a:font script="Beng" typeface="Vrinda"/>
+        <a:font script="Gujr" typeface="Shruti"/>
+        <a:font script="Khmr" typeface="MoolBoran"/>
+        <a:font script="Knda" typeface="Tunga"/>
+        <a:font script="Guru" typeface="Raavi"/>
+        <a:font script="Cans" typeface="Euphemia"/>
+        <a:font script="Cher" typeface="Plantagenet Cherokee"/>
+        <a:font script="Yiii" typeface="Microsoft Yi Baiti"/>
+        <a:font script="Tibt" typeface="Microsoft Himalaya"/>
+        <a:font script="Thaa" typeface="MV Boli"/>
+        <a:font script="Deva" typeface="Mangal"/>
+        <a:font script="Telu" typeface="Gautami"/>
+        <a:font script="Taml" typeface="Latha"/>
+        <a:font script="Syrc" typeface="Estrangelo Edessa"/>
+        <a:font script="Orya" typeface="Kalinga"/>
+        <a:font script="Mlym" typeface="Kartika"/>
+        <a:font script="Laoo" typeface="DokChampa"/>
+        <a:font script="Sinh" typeface="Iskoola Pota"/>
+        <a:font script="Mong" typeface="Mongolian Baiti"/>
+        <a:font script="Viet" typeface="Times New Roman"/>
+        <a:font script="Uigh" typeface="Microsoft Uighur"/>
+        <a:font script="Geor" typeface="Sylfaen"/>
+        <a:font script="Armn" typeface="Arial"/>
+        <a:font script="Bugi" typeface="Leelawadee UI"/>
+        <a:font script="Bopo" typeface="Microsoft JhengHei"/>
+        <a:font script="Java" typeface="Javanese Text"/>
+        <a:font script="Lisu" typeface="Segoe UI"/>
+        <a:font script="Mymr" typeface="Myanmar Text"/>
+        <a:font script="Nkoo" typeface="Ebrima"/>
+        <a:font script="Olck" typeface="Nirmala UI"/>
+        <a:font script="Osma" typeface="Ebrima"/>
+        <a:font script="Phag" typeface="Phagspa"/>
+        <a:font script="Syrn" typeface="Estrangelo Edessa"/>
+        <a:font script="Syrj" typeface="Estrangelo Edessa"/>
+        <a:font script="Syre" typeface="Estrangelo Edessa"/>
+        <a:font script="Sora" typeface="Nirmala UI"/>
+        <a:font script="Tale" typeface="Microsoft Tai Le"/>
+        <a:font script="Talu" typeface="Microsoft New Tai Lue"/>
+        <a:font script="Tfng" typeface="Ebrima"/>
+      </a:majorFont>
+      <a:minorFont>
+        <a:latin typeface="Calibri" panose="020F0502020204030204"/>
+        <a:ea typeface=""/>
+        <a:cs typeface=""/>
+        <a:font script="Jpan" typeface="游ゴシック"/>
+        <a:font script="Hang" typeface="맑은 고딕"/>
+        <a:font script="Hans" typeface="等线"/>
+        <a:font script="Hant" typeface="新細明體"/>
+        <a:font script="Arab" typeface="Arial"/>
+        <a:font script="Hebr" typeface="Arial"/>
+        <a:font script="Thai" typeface="Cordia New"/>
+        <a:font script="Ethi" typeface="Nyala"/>
+        <a:font script="Beng" typeface="Vrinda"/>
+        <a:font script="Gujr" typeface="Shruti"/>
+        <a:font script="Khmr" typeface="DaunPenh"/>
+        <a:font script="Knda" typeface="Tunga"/>
+        <a:font script="Guru" typeface="Raavi"/>
+        <a:font script="Cans" typeface="Euphemia"/>
+        <a:font script="Cher" typeface="Plantagenet Cherokee"/>
+        <a:font script="Yiii" typeface="Microsoft Yi Baiti"/>
+        <a:font script="Tibt" typeface="Microsoft Himalaya"/>
+        <a:font script="Thaa" typeface="MV Boli"/>
+        <a:font script="Deva" typeface="Mangal"/>
+        <a:font script="Telu" typeface="Gautami"/>
+        <a:font script="Taml" typeface="Latha"/>
+        <a:font script="Syrc" typeface="Estrangelo Edessa"/>
+        <a:font script="Orya" typeface="Kalinga"/>
+        <a:font script="Mlym" typeface="Kartika"/>
+        <a:font script="Laoo" typeface="DokChampa"/>
+        <a:font script="Sinh" typeface="Iskoola Pota"/>
+        <a:font script="Mong" typeface="Mongolian Baiti"/>
+        <a:font script="Viet" typeface="Arial"/>
+        <a:font script="Uigh" typeface="Microsoft Uighur"/>
+        <a:font script="Geor" typeface="Sylfaen"/>
+        <a:font script="Armn" typeface="Arial"/>
+        <a:font script="Bugi" typeface="Leelawadee UI"/>
+        <a:font script="Bopo" typeface="Microsoft JhengHei"/>
+        <a:font script="Java" typeface="Javanese Text"/>
+        <a:font script="Lisu" typeface="Segoe UI"/>
+        <a:font script="Mymr" typeface="Myanmar Text"/>
+        <a:font script="Nkoo" typeface="Ebrima"/>
+        <a:font script="Olck" typeface="Nirmala UI"/>
+        <a:font script="Osma" typeface="Ebrima"/>
+        <a:font script="Phag" typeface="Phagspa"/>
+        <a:font script="Syrn" typeface="Estrangelo Edessa"/>
+        <a:font script="Syrj" typeface="Estrangelo Edessa"/>
+        <a:font script="Syre" typeface="Estrangelo Edessa"/>
+        <a:font script="Sora" typeface="Nirmala UI"/>
+        <a:font script="Tale" typeface="Microsoft Tai Le"/>
+        <a:font script="Talu" typeface="Microsoft New Tai Lue"/>
+        <a:font script="Tfng" typeface="Ebrima"/>
+      </a:minorFont>
+    </a:fontScheme>
+    <a:fmtScheme name="Office">
+      <a:fillStyleLst>
+        <a:solidFill>
+          <a:schemeClr val="phClr"/>
+        </a:solidFill>
+        <a:gradFill rotWithShape="1">
+          <a:gsLst>
+            <a:gs pos="0">
+              <a:schemeClr val="phClr">
+                <a:lumMod val="110000"/>
+                <a:satMod val="105000"/>
+                <a:tint val="67000"/>
+              </a:schemeClr>
+            </a:gs>
+            <a:gs pos="50000">
+              <a:schemeClr val="phClr">
+                <a:lumMod val="105000"/>
+                <a:satMod val="103000"/>
+                <a:tint val="73000"/>
+              </a:schemeClr>
+            </a:gs>
+            <a:gs pos="100000">
+              <a:schemeClr val="phClr">
+                <a:lumMod val="105000"/>
+                <a:satMod val="109000"/>
+                <a:tint val="81000"/>
+              </a:schemeClr>
+            </a:gs>
+          </a:gsLst>
+          <a:lin ang="5400000" scaled="0"/>
+        </a:gradFill>
+        <a:gradFill rotWithShape="1">
+          <a:gsLst>
+            <a:gs pos="0">
+              <a:schemeClr val="phClr">
+                <a:satMod val="103000"/>
+                <a:lumMod val="102000"/>
+                <a:tint val="94000"/>
+              </a:schemeClr>
+            </a:gs>
+            <a:gs pos="50000">
+              <a:schemeClr val="phClr">
+                <a:satMod val="110000"/>
+                <a:lumMod val="100000"/>
+                <a:shade val="100000"/>
+              </a:schemeClr>
+            </a:gs>
+            <a:gs pos="100000">
+              <a:schemeClr val="phClr">
+                <a:lumMod val="99000"/>
+                <a:satMod val="120000"/>
+                <a:shade val="78000"/>
+              </a:schemeClr>
+            </a:gs>
+          </a:gsLst>
+          <a:lin ang="5400000" scaled="0"/>
+        </a:gradFill>
+      </a:fillStyleLst>
+      <a:lnStyleLst>
+        <a:ln w="6350" cap="flat" cmpd="sng" algn="ctr">
+          <a:solidFill>
+            <a:schemeClr val="phClr"/>
+          </a:solidFill>
+          <a:prstDash val="solid"/>
+          <a:miter lim="800000"/>
+        </a:ln>
+        <a:ln w="12700" cap="flat" cmpd="sng" algn="ctr">
+          <a:solidFill>
+            <a:schemeClr val="phClr"/>
+          </a:solidFill>
+          <a:prstDash val="solid"/>
+          <a:miter lim="800000"/>
+        </a:ln>
+        <a:ln w="19050" cap="flat" cmpd="sng" algn="ctr">
+          <a:solidFill>
+            <a:schemeClr val="phClr"/>
+          </a:solidFill>
+          <a:prstDash val="solid"/>
+          <a:miter lim="800000"/>
+        </a:ln>
+      </a:lnStyleLst>
+      <a:effectStyleLst>
+        <a:effectStyle>
+          <a:effectLst/>
+        </a:effectStyle>
+        <a:effectStyle>
+          <a:effectLst/>
+        </a:effectStyle>
+        <a:effectStyle>
+          <a:effectLst>
+            <a:outerShdw blurRad="57150" dist="19050" dir="5400000" algn="ctr" rotWithShape="0">
+              <a:srgbClr val="000000">
+                <a:alpha val="63000"/>
+              </a:srgbClr>
+            </a:outerShdw>
+          </a:effectLst>
+        </a:effectStyle>
+      </a:effectStyleLst>
+      <a:bgFillStyleLst>
+        <a:solidFill>
+          <a:schemeClr val="phClr"/>
+        </a:solidFill>
+        <a:solidFill>
+          <a:schemeClr val="phClr">
+            <a:tint val="95000"/>
+            <a:satMod val="170000"/>
+          </a:schemeClr>
+        </a:solidFill>
+        <a:gradFill rotWithShape="1">
+          <a:gsLst>
+            <a:gs pos="0">
+              <a:schemeClr val="phClr">
+                <a:tint val="93000"/>
+                <a:satMod val="150000"/>
+                <a:shade val="98000"/>
+                <a:lumMod val="102000"/>
+              </a:schemeClr>
+            </a:gs>
+            <a:gs pos="50000">
+              <a:schemeClr val="phClr">
+                <a:tint val="98000"/>
+                <a:satMod val="130000"/>
+                <a:shade val="90000"/>
+                <a:lumMod val="103000"/>
+              </a:schemeClr>
+            </a:gs>
+            <a:gs pos="100000">
+              <a:schemeClr val="phClr">
+                <a:shade val="63000"/>
+                <a:satMod val="120000"/>
+              </a:schemeClr>
+            </a:gs>
+          </a:gsLst>
+          <a:lin ang="5400000" scaled="0"/>
+        </a:gradFill>
+      </a:bgFillStyleLst>
+    </a:fmtScheme>
+  </a:themeElements>
+  <a:objectDefaults/>
+  <a:extraClrSchemeLst/>
+  <a:extLst>
+    <a:ext uri="{05A4C25C-085E-4340-85A3-A5531E510DB2}">
+      <thm15:themeFamily xmlns:thm15="http://schemas.microsoft.com/office/thememl/2012/main" name="Office Theme" id="{62F939B6-93AF-4DB8-9C6B-D6C7DFDC589F}" vid="{4A3C46E8-61CC-4603-A589-7422A47A8E4A}"/>
+    </a:ext>
+  </a:extLst>
+</a:theme>
 </file>
</xml_diff>